<commit_message>
Updated Presentation to latest amendment and the Bug Metrics
</commit_message>
<xml_diff>
--- a/presentations/Supervisor Review (week 9).pptx
+++ b/presentations/Supervisor Review (week 9).pptx
@@ -1339,458 +1339,6 @@
       <dsp:cNvGrpSpPr/>
     </dsp:nvGrpSpPr>
     <dsp:grpSpPr/>
-    <dsp:sp modelId="{46493B48-584D-4D4C-AEED-5D2CAE766105}">
-      <dsp:nvSpPr>
-        <dsp:cNvPr id="0" name=""/>
-        <dsp:cNvSpPr/>
-      </dsp:nvSpPr>
-      <dsp:spPr>
-        <a:xfrm>
-          <a:off x="3108960" y="0"/>
-          <a:ext cx="4663440" cy="1737509"/>
-        </a:xfrm>
-        <a:prstGeom prst="rightArrow">
-          <a:avLst>
-            <a:gd name="adj1" fmla="val 75000"/>
-            <a:gd name="adj2" fmla="val 50000"/>
-          </a:avLst>
-        </a:prstGeom>
-        <a:solidFill>
-          <a:schemeClr val="accent1">
-            <a:alpha val="90000"/>
-            <a:tint val="40000"/>
-            <a:hueOff val="0"/>
-            <a:satOff val="0"/>
-            <a:lumOff val="0"/>
-            <a:alphaOff val="0"/>
-          </a:schemeClr>
-        </a:solidFill>
-        <a:ln w="19050" cap="rnd" cmpd="sng" algn="ctr">
-          <a:solidFill>
-            <a:schemeClr val="accent1">
-              <a:alpha val="90000"/>
-              <a:tint val="40000"/>
-              <a:hueOff val="0"/>
-              <a:satOff val="0"/>
-              <a:lumOff val="0"/>
-              <a:alphaOff val="0"/>
-            </a:schemeClr>
-          </a:solidFill>
-          <a:prstDash val="solid"/>
-        </a:ln>
-        <a:effectLst/>
-      </dsp:spPr>
-      <dsp:style>
-        <a:lnRef idx="2">
-          <a:scrgbClr r="0" g="0" b="0"/>
-        </a:lnRef>
-        <a:fillRef idx="1">
-          <a:scrgbClr r="0" g="0" b="0"/>
-        </a:fillRef>
-        <a:effectRef idx="0">
-          <a:scrgbClr r="0" g="0" b="0"/>
-        </a:effectRef>
-        <a:fontRef idx="minor"/>
-      </dsp:style>
-      <dsp:txBody>
-        <a:bodyPr spcFirstLastPara="0" vert="horz" wrap="square" lIns="12700" tIns="12700" rIns="12700" bIns="12700" numCol="1" spcCol="1270" anchor="t" anchorCtr="0">
-          <a:noAutofit/>
-        </a:bodyPr>
-        <a:lstStyle/>
-        <a:p>
-          <a:pPr marL="228600" lvl="1" indent="-228600" algn="l" defTabSz="889000">
-            <a:lnSpc>
-              <a:spcPct val="90000"/>
-            </a:lnSpc>
-            <a:spcBef>
-              <a:spcPct val="0"/>
-            </a:spcBef>
-            <a:spcAft>
-              <a:spcPct val="15000"/>
-            </a:spcAft>
-            <a:buChar char="••"/>
-          </a:pPr>
-          <a:r>
-            <a:rPr lang="en-GB" sz="2000" kern="1200" dirty="0" smtClean="0"/>
-            <a:t>Basic App Report</a:t>
-          </a:r>
-          <a:br>
-            <a:rPr lang="en-GB" sz="2000" kern="1200" dirty="0" smtClean="0"/>
-          </a:br>
-          <a:r>
-            <a:rPr lang="en-GB" sz="2000" kern="1200" dirty="0" smtClean="0"/>
-            <a:t>(Week 1 of Iteration, 15/10 – 17/10)</a:t>
-          </a:r>
-          <a:endParaRPr lang="en-GB" sz="2000" kern="1200" dirty="0"/>
-        </a:p>
-        <a:p>
-          <a:pPr marL="228600" lvl="1" indent="-228600" algn="l" defTabSz="889000">
-            <a:lnSpc>
-              <a:spcPct val="90000"/>
-            </a:lnSpc>
-            <a:spcBef>
-              <a:spcPct val="0"/>
-            </a:spcBef>
-            <a:spcAft>
-              <a:spcPct val="15000"/>
-            </a:spcAft>
-            <a:buChar char="••"/>
-          </a:pPr>
-          <a:r>
-            <a:rPr lang="en-GB" sz="2000" kern="1200" dirty="0" smtClean="0"/>
-            <a:t>Social Activeness</a:t>
-          </a:r>
-          <a:br>
-            <a:rPr lang="en-GB" sz="2000" kern="1200" dirty="0" smtClean="0"/>
-          </a:br>
-          <a:r>
-            <a:rPr lang="en-GB" sz="2000" kern="1200" dirty="0" smtClean="0"/>
-            <a:t>(Week 2 of Iteration, 22/10 – 23/10)</a:t>
-          </a:r>
-          <a:endParaRPr lang="en-GB" sz="2000" kern="1200" dirty="0"/>
-        </a:p>
-      </dsp:txBody>
-      <dsp:txXfrm>
-        <a:off x="3108960" y="217189"/>
-        <a:ext cx="4011874" cy="1303131"/>
-      </dsp:txXfrm>
-    </dsp:sp>
-    <dsp:sp modelId="{6D57C231-7D24-419B-AD0F-88A0034271E6}">
-      <dsp:nvSpPr>
-        <dsp:cNvPr id="0" name=""/>
-        <dsp:cNvSpPr/>
-      </dsp:nvSpPr>
-      <dsp:spPr>
-        <a:xfrm>
-          <a:off x="0" y="445"/>
-          <a:ext cx="3108960" cy="1737509"/>
-        </a:xfrm>
-        <a:prstGeom prst="roundRect">
-          <a:avLst/>
-        </a:prstGeom>
-        <a:solidFill>
-          <a:srgbClr val="FF0000"/>
-        </a:solidFill>
-        <a:ln w="19050" cap="rnd" cmpd="sng" algn="ctr">
-          <a:solidFill>
-            <a:schemeClr val="lt1">
-              <a:hueOff val="0"/>
-              <a:satOff val="0"/>
-              <a:lumOff val="0"/>
-              <a:alphaOff val="0"/>
-            </a:schemeClr>
-          </a:solidFill>
-          <a:prstDash val="solid"/>
-        </a:ln>
-        <a:effectLst/>
-      </dsp:spPr>
-      <dsp:style>
-        <a:lnRef idx="2">
-          <a:scrgbClr r="0" g="0" b="0"/>
-        </a:lnRef>
-        <a:fillRef idx="1">
-          <a:scrgbClr r="0" g="0" b="0"/>
-        </a:fillRef>
-        <a:effectRef idx="0">
-          <a:scrgbClr r="0" g="0" b="0"/>
-        </a:effectRef>
-        <a:fontRef idx="minor">
-          <a:schemeClr val="lt1"/>
-        </a:fontRef>
-      </dsp:style>
-      <dsp:txBody>
-        <a:bodyPr spcFirstLastPara="0" vert="horz" wrap="square" lIns="102870" tIns="51435" rIns="102870" bIns="51435" numCol="1" spcCol="1270" anchor="ctr" anchorCtr="0">
-          <a:noAutofit/>
-        </a:bodyPr>
-        <a:lstStyle/>
-        <a:p>
-          <a:pPr lvl="0" algn="ctr" defTabSz="1200150">
-            <a:lnSpc>
-              <a:spcPct val="90000"/>
-            </a:lnSpc>
-            <a:spcBef>
-              <a:spcPct val="0"/>
-            </a:spcBef>
-            <a:spcAft>
-              <a:spcPct val="35000"/>
-            </a:spcAft>
-          </a:pPr>
-          <a:r>
-            <a:rPr lang="en-GB" sz="2700" kern="1200" dirty="0" smtClean="0"/>
-            <a:t>Pair 1:</a:t>
-          </a:r>
-        </a:p>
-        <a:p>
-          <a:pPr lvl="0" algn="ctr" defTabSz="1200150">
-            <a:lnSpc>
-              <a:spcPct val="90000"/>
-            </a:lnSpc>
-            <a:spcBef>
-              <a:spcPct val="0"/>
-            </a:spcBef>
-            <a:spcAft>
-              <a:spcPct val="35000"/>
-            </a:spcAft>
-          </a:pPr>
-          <a:r>
-            <a:rPr lang="en-GB" sz="2700" kern="1200" dirty="0" smtClean="0"/>
-            <a:t>Jeremy Ong</a:t>
-          </a:r>
-        </a:p>
-        <a:p>
-          <a:pPr lvl="0" algn="ctr" defTabSz="1200150">
-            <a:lnSpc>
-              <a:spcPct val="90000"/>
-            </a:lnSpc>
-            <a:spcBef>
-              <a:spcPct val="0"/>
-            </a:spcBef>
-            <a:spcAft>
-              <a:spcPct val="35000"/>
-            </a:spcAft>
-          </a:pPr>
-          <a:r>
-            <a:rPr lang="en-GB" sz="2700" kern="1200" dirty="0" smtClean="0"/>
-            <a:t>Tan </a:t>
-          </a:r>
-          <a:r>
-            <a:rPr lang="en-GB" sz="2700" kern="1200" dirty="0" err="1" smtClean="0"/>
-            <a:t>Zhi</a:t>
-          </a:r>
-          <a:r>
-            <a:rPr lang="en-GB" sz="2700" kern="1200" dirty="0" smtClean="0"/>
-            <a:t> Hui</a:t>
-          </a:r>
-          <a:endParaRPr lang="en-GB" sz="2700" kern="1200" dirty="0"/>
-        </a:p>
-      </dsp:txBody>
-      <dsp:txXfrm>
-        <a:off x="84818" y="85263"/>
-        <a:ext cx="2939324" cy="1567873"/>
-      </dsp:txXfrm>
-    </dsp:sp>
-    <dsp:sp modelId="{71323EE6-2ECB-4D46-AC56-3788E530B02E}">
-      <dsp:nvSpPr>
-        <dsp:cNvPr id="0" name=""/>
-        <dsp:cNvSpPr/>
-      </dsp:nvSpPr>
-      <dsp:spPr>
-        <a:xfrm>
-          <a:off x="3108960" y="1911706"/>
-          <a:ext cx="4663440" cy="1737509"/>
-        </a:xfrm>
-        <a:prstGeom prst="rightArrow">
-          <a:avLst>
-            <a:gd name="adj1" fmla="val 75000"/>
-            <a:gd name="adj2" fmla="val 50000"/>
-          </a:avLst>
-        </a:prstGeom>
-        <a:solidFill>
-          <a:schemeClr val="accent1">
-            <a:alpha val="90000"/>
-            <a:tint val="40000"/>
-            <a:hueOff val="0"/>
-            <a:satOff val="0"/>
-            <a:lumOff val="0"/>
-            <a:alphaOff val="0"/>
-          </a:schemeClr>
-        </a:solidFill>
-        <a:ln w="19050" cap="rnd" cmpd="sng" algn="ctr">
-          <a:solidFill>
-            <a:schemeClr val="accent1">
-              <a:alpha val="90000"/>
-              <a:tint val="40000"/>
-              <a:hueOff val="0"/>
-              <a:satOff val="0"/>
-              <a:lumOff val="0"/>
-              <a:alphaOff val="0"/>
-            </a:schemeClr>
-          </a:solidFill>
-          <a:prstDash val="solid"/>
-        </a:ln>
-        <a:effectLst/>
-      </dsp:spPr>
-      <dsp:style>
-        <a:lnRef idx="2">
-          <a:scrgbClr r="0" g="0" b="0"/>
-        </a:lnRef>
-        <a:fillRef idx="1">
-          <a:scrgbClr r="0" g="0" b="0"/>
-        </a:fillRef>
-        <a:effectRef idx="0">
-          <a:scrgbClr r="0" g="0" b="0"/>
-        </a:effectRef>
-        <a:fontRef idx="minor"/>
-      </dsp:style>
-      <dsp:txBody>
-        <a:bodyPr spcFirstLastPara="0" vert="horz" wrap="square" lIns="12700" tIns="12700" rIns="12700" bIns="12700" numCol="1" spcCol="1270" anchor="t" anchorCtr="0">
-          <a:noAutofit/>
-        </a:bodyPr>
-        <a:lstStyle/>
-        <a:p>
-          <a:pPr marL="228600" lvl="1" indent="-228600" algn="l" defTabSz="889000">
-            <a:lnSpc>
-              <a:spcPct val="90000"/>
-            </a:lnSpc>
-            <a:spcBef>
-              <a:spcPct val="0"/>
-            </a:spcBef>
-            <a:spcAft>
-              <a:spcPct val="15000"/>
-            </a:spcAft>
-            <a:buChar char="••"/>
-          </a:pPr>
-          <a:r>
-            <a:rPr lang="en-GB" sz="2000" kern="1200" dirty="0" smtClean="0"/>
-            <a:t>Smartphone overuse</a:t>
-          </a:r>
-          <a:br>
-            <a:rPr lang="en-GB" sz="2000" kern="1200" dirty="0" smtClean="0"/>
-          </a:br>
-          <a:r>
-            <a:rPr lang="en-GB" sz="2000" kern="1200" dirty="0" smtClean="0"/>
-            <a:t>(Week 1 of Iteration, 12/10 – 13/10)</a:t>
-          </a:r>
-          <a:endParaRPr lang="en-GB" sz="2000" kern="1200" dirty="0"/>
-        </a:p>
-        <a:p>
-          <a:pPr marL="228600" lvl="1" indent="-228600" algn="l" defTabSz="889000">
-            <a:lnSpc>
-              <a:spcPct val="90000"/>
-            </a:lnSpc>
-            <a:spcBef>
-              <a:spcPct val="0"/>
-            </a:spcBef>
-            <a:spcAft>
-              <a:spcPct val="15000"/>
-            </a:spcAft>
-            <a:buChar char="••"/>
-          </a:pPr>
-          <a:r>
-            <a:rPr lang="en-GB" sz="2000" kern="1200" dirty="0" smtClean="0"/>
-            <a:t>Top-K Report</a:t>
-          </a:r>
-          <a:br>
-            <a:rPr lang="en-GB" sz="2000" kern="1200" dirty="0" smtClean="0"/>
-          </a:br>
-          <a:r>
-            <a:rPr lang="en-GB" sz="2000" kern="1200" dirty="0" smtClean="0"/>
-            <a:t>(Week 2 of Iteration, 17/10 – 23/10)</a:t>
-          </a:r>
-          <a:endParaRPr lang="en-GB" sz="2000" kern="1200" dirty="0"/>
-        </a:p>
-      </dsp:txBody>
-      <dsp:txXfrm>
-        <a:off x="3108960" y="2128895"/>
-        <a:ext cx="4011874" cy="1303131"/>
-      </dsp:txXfrm>
-    </dsp:sp>
-    <dsp:sp modelId="{BD3E2191-A1A4-42B3-B582-4EB16DE935F1}">
-      <dsp:nvSpPr>
-        <dsp:cNvPr id="0" name=""/>
-        <dsp:cNvSpPr/>
-      </dsp:nvSpPr>
-      <dsp:spPr>
-        <a:xfrm>
-          <a:off x="0" y="1911706"/>
-          <a:ext cx="3108960" cy="1737509"/>
-        </a:xfrm>
-        <a:prstGeom prst="roundRect">
-          <a:avLst/>
-        </a:prstGeom>
-        <a:solidFill>
-          <a:srgbClr val="FF0000"/>
-        </a:solidFill>
-        <a:ln w="19050" cap="rnd" cmpd="sng" algn="ctr">
-          <a:solidFill>
-            <a:schemeClr val="lt1">
-              <a:hueOff val="0"/>
-              <a:satOff val="0"/>
-              <a:lumOff val="0"/>
-              <a:alphaOff val="0"/>
-            </a:schemeClr>
-          </a:solidFill>
-          <a:prstDash val="solid"/>
-        </a:ln>
-        <a:effectLst/>
-      </dsp:spPr>
-      <dsp:style>
-        <a:lnRef idx="2">
-          <a:scrgbClr r="0" g="0" b="0"/>
-        </a:lnRef>
-        <a:fillRef idx="1">
-          <a:scrgbClr r="0" g="0" b="0"/>
-        </a:fillRef>
-        <a:effectRef idx="0">
-          <a:scrgbClr r="0" g="0" b="0"/>
-        </a:effectRef>
-        <a:fontRef idx="minor">
-          <a:schemeClr val="lt1"/>
-        </a:fontRef>
-      </dsp:style>
-      <dsp:txBody>
-        <a:bodyPr spcFirstLastPara="0" vert="horz" wrap="square" lIns="102870" tIns="51435" rIns="102870" bIns="51435" numCol="1" spcCol="1270" anchor="ctr" anchorCtr="0">
-          <a:noAutofit/>
-        </a:bodyPr>
-        <a:lstStyle/>
-        <a:p>
-          <a:pPr lvl="0" algn="ctr" defTabSz="1200150">
-            <a:lnSpc>
-              <a:spcPct val="90000"/>
-            </a:lnSpc>
-            <a:spcBef>
-              <a:spcPct val="0"/>
-            </a:spcBef>
-            <a:spcAft>
-              <a:spcPct val="35000"/>
-            </a:spcAft>
-          </a:pPr>
-          <a:r>
-            <a:rPr lang="en-GB" sz="2700" kern="1200" dirty="0" smtClean="0"/>
-            <a:t>Pair 2:</a:t>
-          </a:r>
-        </a:p>
-        <a:p>
-          <a:pPr lvl="0" algn="ctr" defTabSz="1200150">
-            <a:lnSpc>
-              <a:spcPct val="90000"/>
-            </a:lnSpc>
-            <a:spcBef>
-              <a:spcPct val="0"/>
-            </a:spcBef>
-            <a:spcAft>
-              <a:spcPct val="35000"/>
-            </a:spcAft>
-          </a:pPr>
-          <a:r>
-            <a:rPr lang="en-GB" sz="2700" kern="1200" dirty="0" smtClean="0"/>
-            <a:t>Yee Shu Wen</a:t>
-          </a:r>
-        </a:p>
-        <a:p>
-          <a:pPr lvl="0" algn="ctr" defTabSz="1200150">
-            <a:lnSpc>
-              <a:spcPct val="90000"/>
-            </a:lnSpc>
-            <a:spcBef>
-              <a:spcPct val="0"/>
-            </a:spcBef>
-            <a:spcAft>
-              <a:spcPct val="35000"/>
-            </a:spcAft>
-          </a:pPr>
-          <a:r>
-            <a:rPr lang="en-GB" sz="2700" kern="1200" dirty="0" err="1" smtClean="0"/>
-            <a:t>Nabilah</a:t>
-          </a:r>
-          <a:endParaRPr lang="en-GB" sz="2700" kern="1200" dirty="0"/>
-        </a:p>
-      </dsp:txBody>
-      <dsp:txXfrm>
-        <a:off x="84818" y="1996524"/>
-        <a:ext cx="2939324" cy="1567873"/>
-      </dsp:txXfrm>
-    </dsp:sp>
   </dsp:spTree>
 </dsp:drawing>
 </file>
@@ -24274,8 +23822,8 @@
         </p:nvSpPr>
         <p:spPr>
           <a:xfrm>
-            <a:off x="1385766" y="2662782"/>
-            <a:ext cx="1678665" cy="1862048"/>
+            <a:off x="1759266" y="2662782"/>
+            <a:ext cx="931665" cy="1862048"/>
           </a:xfrm>
           <a:prstGeom prst="rect">
             <a:avLst/>
@@ -24298,7 +23846,7 @@
                   <a:srgbClr val="FF0000"/>
                 </a:solidFill>
               </a:rPr>
-              <a:t>11</a:t>
+              <a:t>5</a:t>
             </a:r>
             <a:endParaRPr lang="en-US" sz="2000" b="0" cap="none" spc="0" dirty="0">
               <a:ln w="76200">
@@ -24320,8 +23868,8 @@
         </p:nvSpPr>
         <p:spPr>
           <a:xfrm>
-            <a:off x="514348" y="4409528"/>
-            <a:ext cx="3254977" cy="1200329"/>
+            <a:off x="181977" y="4401291"/>
+            <a:ext cx="3943377" cy="1200329"/>
           </a:xfrm>
           <a:prstGeom prst="rect">
             <a:avLst/>
@@ -24351,7 +23899,7 @@
                   </a:innerShdw>
                 </a:effectLst>
               </a:rPr>
-              <a:t>CRITICAL. Stop and Review.</a:t>
+              <a:t>Fix during planned debugging</a:t>
             </a:r>
             <a:endParaRPr lang="en-US" sz="3600" b="1" u="sng" spc="50" dirty="0">
               <a:ln w="0"/>
@@ -24817,12 +24365,12 @@
                     <a:p>
                       <a:pPr algn="l" fontAlgn="b"/>
                       <a:r>
-                        <a:rPr lang="en-GB" sz="1200" u="none" strike="noStrike">
+                        <a:rPr lang="en-GB" sz="1200" u="none" strike="noStrike" dirty="0">
                           <a:effectLst/>
                         </a:rPr>
                         <a:t>Issue</a:t>
                       </a:r>
-                      <a:endParaRPr lang="en-GB" sz="1200" b="1" i="0" u="none" strike="noStrike">
+                      <a:endParaRPr lang="en-GB" sz="1200" b="1" i="0" u="none" strike="noStrike" dirty="0">
                         <a:solidFill>
                           <a:srgbClr val="000000"/>
                         </a:solidFill>
@@ -26444,12 +25992,12 @@
                     <a:p>
                       <a:pPr algn="l" fontAlgn="b"/>
                       <a:r>
-                        <a:rPr lang="en-GB" sz="1200" u="none" strike="noStrike">
+                        <a:rPr lang="en-GB" sz="1200" u="none" strike="noStrike" dirty="0">
                           <a:effectLst/>
                         </a:rPr>
                         <a:t>N</a:t>
                       </a:r>
-                      <a:endParaRPr lang="en-GB" sz="1200" b="0" i="0" u="none" strike="noStrike">
+                      <a:endParaRPr lang="en-GB" sz="1200" b="0" i="0" u="none" strike="noStrike" dirty="0">
                         <a:solidFill>
                           <a:srgbClr val="000000"/>
                         </a:solidFill>
@@ -26915,7 +26463,7 @@
             <p:ph idx="1"/>
             <p:extLst>
               <p:ext uri="{D42A27DB-BD31-4B8C-83A1-F6EECF244321}">
-                <p14:modId xmlns:p14="http://schemas.microsoft.com/office/powerpoint/2010/main" val="917184298"/>
+                <p14:modId xmlns:p14="http://schemas.microsoft.com/office/powerpoint/2010/main" val="3689795598"/>
               </p:ext>
             </p:extLst>
           </p:nvPr>
@@ -26947,12 +26495,12 @@
                     <a:p>
                       <a:pPr algn="r" fontAlgn="b"/>
                       <a:r>
-                        <a:rPr lang="en-GB" sz="1000" u="none" strike="noStrike">
+                        <a:rPr lang="en-GB" sz="1000" u="none" strike="noStrike" dirty="0">
                           <a:effectLst/>
                         </a:rPr>
                         <a:t>11</a:t>
                       </a:r>
-                      <a:endParaRPr lang="en-GB" sz="1000" b="0" i="0" u="none" strike="noStrike">
+                      <a:endParaRPr lang="en-GB" sz="1000" b="0" i="0" u="none" strike="noStrike" dirty="0">
                         <a:solidFill>
                           <a:srgbClr val="000000"/>
                         </a:solidFill>
@@ -27900,12 +27448,16 @@
                     <a:p>
                       <a:pPr algn="l" fontAlgn="b"/>
                       <a:r>
-                        <a:rPr lang="en-GB" sz="1000" u="none" strike="noStrike">
+                        <a:rPr lang="en-US" sz="1000" b="0" i="0" u="none" strike="noStrike" dirty="0" smtClean="0">
+                          <a:solidFill>
+                            <a:schemeClr val="dk1"/>
+                          </a:solidFill>
                           <a:effectLst/>
+                          <a:latin typeface="+mn-lt"/>
                         </a:rPr>
-                        <a:t>N</a:t>
+                        <a:t>Y</a:t>
                       </a:r>
-                      <a:endParaRPr lang="en-GB" sz="1000" b="0" i="0" u="none" strike="noStrike">
+                      <a:endParaRPr lang="en-GB" sz="1000" b="0" i="0" u="none" strike="noStrike" dirty="0">
                         <a:solidFill>
                           <a:srgbClr val="000000"/>
                         </a:solidFill>
@@ -28643,7 +28195,7 @@
             <p:ph idx="1"/>
             <p:extLst>
               <p:ext uri="{D42A27DB-BD31-4B8C-83A1-F6EECF244321}">
-                <p14:modId xmlns:p14="http://schemas.microsoft.com/office/powerpoint/2010/main" val="581793621"/>
+                <p14:modId xmlns:p14="http://schemas.microsoft.com/office/powerpoint/2010/main" val="495960707"/>
               </p:ext>
             </p:extLst>
           </p:nvPr>
@@ -28675,12 +28227,12 @@
                     <a:p>
                       <a:pPr algn="r" fontAlgn="b"/>
                       <a:r>
-                        <a:rPr lang="en-GB" sz="900" u="none" strike="noStrike">
+                        <a:rPr lang="en-GB" sz="900" u="none" strike="noStrike" dirty="0">
                           <a:effectLst/>
                         </a:rPr>
                         <a:t>21</a:t>
                       </a:r>
-                      <a:endParaRPr lang="en-GB" sz="900" b="0" i="0" u="none" strike="noStrike">
+                      <a:endParaRPr lang="en-GB" sz="900" b="0" i="0" u="none" strike="noStrike" dirty="0">
                         <a:solidFill>
                           <a:srgbClr val="000000"/>
                         </a:solidFill>
@@ -28976,10 +28528,14 @@
                     <a:p>
                       <a:pPr algn="l" fontAlgn="b"/>
                       <a:r>
-                        <a:rPr lang="en-GB" sz="900" u="none" strike="noStrike">
+                        <a:rPr lang="en-US" sz="900" b="0" i="0" u="none" strike="noStrike" smtClean="0">
+                          <a:solidFill>
+                            <a:schemeClr val="dk1"/>
+                          </a:solidFill>
                           <a:effectLst/>
+                          <a:latin typeface="+mn-lt"/>
                         </a:rPr>
-                        <a:t>N</a:t>
+                        <a:t>Y</a:t>
                       </a:r>
                       <a:endParaRPr lang="en-GB" sz="900" b="0" i="0" u="none" strike="noStrike">
                         <a:solidFill>

</xml_diff>

<commit_message>
Changed title of presentation
</commit_message>
<xml_diff>
--- a/presentations/Supervisor Review (week 9).pptx
+++ b/presentations/Supervisor Review (week 9).pptx
@@ -8862,8 +8862,12 @@
           <a:lstStyle/>
           <a:p>
             <a:r>
-              <a:rPr lang="en-GB" dirty="0" smtClean="0"/>
-              <a:t>Supervisor Review (week 9)</a:t>
+              <a:rPr lang="en-GB" smtClean="0"/>
+              <a:t>Supervisor </a:t>
+            </a:r>
+            <a:r>
+              <a:rPr lang="en-GB" smtClean="0"/>
+              <a:t>Meeting</a:t>
             </a:r>
             <a:endParaRPr lang="en-GB" dirty="0"/>
           </a:p>

</xml_diff>